<commit_message>
change slides order minorly
</commit_message>
<xml_diff>
--- a/final/BT-like-peer2peer.pptx
+++ b/final/BT-like-peer2peer.pptx
@@ -321,7 +321,7 @@
               <a:pPr>
                 <a:defRPr/>
               </a:pPr>
-              <a:t>2016/6/13</a:t>
+              <a:t>2016/6/14</a:t>
             </a:fld>
             <a:endParaRPr lang="zh-TW" altLang="en-US"/>
           </a:p>
@@ -512,7 +512,7 @@
               <a:pPr>
                 <a:defRPr/>
               </a:pPr>
-              <a:t>2016/6/13</a:t>
+              <a:t>2016/6/14</a:t>
             </a:fld>
             <a:endParaRPr lang="zh-TW" altLang="en-US"/>
           </a:p>
@@ -29716,8 +29716,8 @@
           </a:p>
         </p:txBody>
       </p:sp>
-      <mc:AlternateContent xmlns:mc="http://schemas.openxmlformats.org/markup-compatibility/2006" xmlns:a14="http://schemas.microsoft.com/office/drawing/2010/main">
-        <mc:Choice Requires="a14">
+      <mc:AlternateContent xmlns:mc="http://schemas.openxmlformats.org/markup-compatibility/2006">
+        <mc:Choice xmlns:a14="http://schemas.microsoft.com/office/drawing/2010/main" Requires="a14">
           <p:sp>
             <p:nvSpPr>
               <p:cNvPr id="3" name="內容版面配置區 2"/>
@@ -29849,28 +29849,32 @@
               <a:p>
                 <a:r>
                   <a:rPr lang="en-US" altLang="zh-TW" dirty="0" smtClean="0"/>
-                  <a:t>Optimistic </a:t>
-                </a:r>
-                <a:r>
-                  <a:rPr lang="en-US" altLang="zh-TW" dirty="0" err="1" smtClean="0"/>
-                  <a:t>unchoking</a:t>
-                </a:r>
-                <a:r>
-                  <a:rPr lang="en-US" altLang="zh-TW" dirty="0" smtClean="0"/>
-                  <a:t> happens once every 30 seconds.</a:t>
-                </a:r>
-              </a:p>
-              <a:p>
-                <a:endParaRPr lang="en-US" altLang="zh-TW" dirty="0" smtClean="0"/>
-              </a:p>
-              <a:p>
-                <a:r>
-                  <a:rPr lang="en-US" altLang="zh-TW" dirty="0" smtClean="0"/>
                   <a:t>Then peer </a:t>
                 </a:r>
                 <a:r>
                   <a:rPr lang="en-US" altLang="zh-TW" dirty="0"/>
                   <a:t>with the least downloading rate is dropped</a:t>
+                </a:r>
+                <a:r>
+                  <a:rPr lang="en-US" altLang="zh-TW" dirty="0" smtClean="0"/>
+                  <a:t>.</a:t>
+                </a:r>
+              </a:p>
+              <a:p>
+                <a:endParaRPr lang="en-US" altLang="zh-TW" dirty="0"/>
+              </a:p>
+              <a:p>
+                <a:r>
+                  <a:rPr lang="en-US" altLang="zh-TW" dirty="0"/>
+                  <a:t>Optimistic </a:t>
+                </a:r>
+                <a:r>
+                  <a:rPr lang="en-US" altLang="zh-TW" dirty="0" err="1"/>
+                  <a:t>unchoking</a:t>
+                </a:r>
+                <a:r>
+                  <a:rPr lang="en-US" altLang="zh-TW" dirty="0"/>
+                  <a:t> happens once every 30 seconds</a:t>
                 </a:r>
                 <a:r>
                   <a:rPr lang="en-US" altLang="zh-TW" dirty="0" smtClean="0"/>
@@ -29891,7 +29895,7 @@
             </p:txBody>
           </p:sp>
         </mc:Choice>
-        <mc:Fallback xmlns="">
+        <mc:Fallback>
           <p:sp>
             <p:nvSpPr>
               <p:cNvPr id="3" name="內容版面配置區 2"/>
@@ -31083,8 +31087,8 @@
           </a:p>
         </p:txBody>
       </p:sp>
-      <mc:AlternateContent xmlns:mc="http://schemas.openxmlformats.org/markup-compatibility/2006" xmlns:a14="http://schemas.microsoft.com/office/drawing/2010/main">
-        <mc:Choice Requires="a14">
+      <mc:AlternateContent xmlns:mc="http://schemas.openxmlformats.org/markup-compatibility/2006">
+        <mc:Choice xmlns:a14="http://schemas.microsoft.com/office/drawing/2010/main" Requires="a14">
           <p:sp>
             <p:nvSpPr>
               <p:cNvPr id="3" name="內容版面配置區 2"/>
@@ -31399,7 +31403,15 @@
                 </a14:m>
                 <a:r>
                   <a:rPr lang="en-US" altLang="zh-TW" dirty="0" smtClean="0"/>
-                  <a:t>: the downloading of a given peer.</a:t>
+                  <a:t>: the downloading </a:t>
+                </a:r>
+                <a:r>
+                  <a:rPr lang="en-US" altLang="zh-TW" dirty="0" smtClean="0"/>
+                  <a:t>bandwidth of </a:t>
+                </a:r>
+                <a:r>
+                  <a:rPr lang="en-US" altLang="zh-TW" dirty="0" smtClean="0"/>
+                  <a:t>a given peer.</a:t>
                 </a:r>
               </a:p>
               <a:p>
@@ -31507,7 +31519,7 @@
             </p:txBody>
           </p:sp>
         </mc:Choice>
-        <mc:Fallback xmlns="">
+        <mc:Fallback>
           <p:sp>
             <p:nvSpPr>
               <p:cNvPr id="3" name="內容版面配置區 2"/>

</xml_diff>